<commit_message>
Introduced UCM for central control of channels from different devices
</commit_message>
<xml_diff>
--- a/esibd/media/icon.pptx
+++ b/esibd/media/icon.pptx
@@ -207,7 +207,7 @@
           <a:p>
             <a:fld id="{812FED39-EA42-4609-848E-8152CE57DB5B}" type="datetimeFigureOut">
               <a:rPr lang="en-US" smtClean="0"/>
-              <a:t>9/26/2023</a:t>
+              <a:t>11/16/2024</a:t>
             </a:fld>
             <a:endParaRPr lang="en-US"/>
           </a:p>
@@ -1073,7 +1073,7 @@
           <a:p>
             <a:fld id="{DA5CD527-E96A-465D-B0D8-7970016FA740}" type="datetimeFigureOut">
               <a:rPr lang="en-US" smtClean="0"/>
-              <a:t>9/26/2023</a:t>
+              <a:t>11/16/2024</a:t>
             </a:fld>
             <a:endParaRPr lang="en-US"/>
           </a:p>
@@ -1271,7 +1271,7 @@
           <a:p>
             <a:fld id="{DA5CD527-E96A-465D-B0D8-7970016FA740}" type="datetimeFigureOut">
               <a:rPr lang="en-US" smtClean="0"/>
-              <a:t>9/26/2023</a:t>
+              <a:t>11/16/2024</a:t>
             </a:fld>
             <a:endParaRPr lang="en-US"/>
           </a:p>
@@ -1479,7 +1479,7 @@
           <a:p>
             <a:fld id="{DA5CD527-E96A-465D-B0D8-7970016FA740}" type="datetimeFigureOut">
               <a:rPr lang="en-US" smtClean="0"/>
-              <a:t>9/26/2023</a:t>
+              <a:t>11/16/2024</a:t>
             </a:fld>
             <a:endParaRPr lang="en-US"/>
           </a:p>
@@ -1677,7 +1677,7 @@
           <a:p>
             <a:fld id="{DA5CD527-E96A-465D-B0D8-7970016FA740}" type="datetimeFigureOut">
               <a:rPr lang="en-US" smtClean="0"/>
-              <a:t>9/26/2023</a:t>
+              <a:t>11/16/2024</a:t>
             </a:fld>
             <a:endParaRPr lang="en-US"/>
           </a:p>
@@ -1952,7 +1952,7 @@
           <a:p>
             <a:fld id="{DA5CD527-E96A-465D-B0D8-7970016FA740}" type="datetimeFigureOut">
               <a:rPr lang="en-US" smtClean="0"/>
-              <a:t>9/26/2023</a:t>
+              <a:t>11/16/2024</a:t>
             </a:fld>
             <a:endParaRPr lang="en-US"/>
           </a:p>
@@ -2217,7 +2217,7 @@
           <a:p>
             <a:fld id="{DA5CD527-E96A-465D-B0D8-7970016FA740}" type="datetimeFigureOut">
               <a:rPr lang="en-US" smtClean="0"/>
-              <a:t>9/26/2023</a:t>
+              <a:t>11/16/2024</a:t>
             </a:fld>
             <a:endParaRPr lang="en-US"/>
           </a:p>
@@ -2629,7 +2629,7 @@
           <a:p>
             <a:fld id="{DA5CD527-E96A-465D-B0D8-7970016FA740}" type="datetimeFigureOut">
               <a:rPr lang="en-US" smtClean="0"/>
-              <a:t>9/26/2023</a:t>
+              <a:t>11/16/2024</a:t>
             </a:fld>
             <a:endParaRPr lang="en-US"/>
           </a:p>
@@ -2770,7 +2770,7 @@
           <a:p>
             <a:fld id="{DA5CD527-E96A-465D-B0D8-7970016FA740}" type="datetimeFigureOut">
               <a:rPr lang="en-US" smtClean="0"/>
-              <a:t>9/26/2023</a:t>
+              <a:t>11/16/2024</a:t>
             </a:fld>
             <a:endParaRPr lang="en-US"/>
           </a:p>
@@ -2883,7 +2883,7 @@
           <a:p>
             <a:fld id="{DA5CD527-E96A-465D-B0D8-7970016FA740}" type="datetimeFigureOut">
               <a:rPr lang="en-US" smtClean="0"/>
-              <a:t>9/26/2023</a:t>
+              <a:t>11/16/2024</a:t>
             </a:fld>
             <a:endParaRPr lang="en-US"/>
           </a:p>
@@ -3194,7 +3194,7 @@
           <a:p>
             <a:fld id="{DA5CD527-E96A-465D-B0D8-7970016FA740}" type="datetimeFigureOut">
               <a:rPr lang="en-US" smtClean="0"/>
-              <a:t>9/26/2023</a:t>
+              <a:t>11/16/2024</a:t>
             </a:fld>
             <a:endParaRPr lang="en-US"/>
           </a:p>
@@ -3482,7 +3482,7 @@
           <a:p>
             <a:fld id="{DA5CD527-E96A-465D-B0D8-7970016FA740}" type="datetimeFigureOut">
               <a:rPr lang="en-US" smtClean="0"/>
-              <a:t>9/26/2023</a:t>
+              <a:t>11/16/2024</a:t>
             </a:fld>
             <a:endParaRPr lang="en-US"/>
           </a:p>
@@ -3723,7 +3723,7 @@
           <a:p>
             <a:fld id="{DA5CD527-E96A-465D-B0D8-7970016FA740}" type="datetimeFigureOut">
               <a:rPr lang="en-US" smtClean="0"/>
-              <a:t>9/26/2023</a:t>
+              <a:t>11/16/2024</a:t>
             </a:fld>
             <a:endParaRPr lang="en-US"/>
           </a:p>
@@ -15204,31 +15204,667 @@
           </a:p>
         </p:txBody>
       </p:sp>
-      <p:sp>
-        <p:nvSpPr>
-          <p:cNvPr id="3" name="Content Placeholder 2">
+      <p:grpSp>
+        <p:nvGrpSpPr>
+          <p:cNvPr id="59" name="Group 58">
             <a:extLst>
               <a:ext uri="{FF2B5EF4-FFF2-40B4-BE49-F238E27FC236}">
-                <a16:creationId xmlns:a16="http://schemas.microsoft.com/office/drawing/2014/main" id="{55BC93B3-209E-EA8B-3F9B-8A08BED03B37}"/>
+                <a16:creationId xmlns:a16="http://schemas.microsoft.com/office/drawing/2014/main" id="{BEC1966E-7D61-21D8-6BC6-A4E5B816FB08}"/>
               </a:ext>
             </a:extLst>
           </p:cNvPr>
-          <p:cNvSpPr>
-            <a:spLocks noGrp="1"/>
-          </p:cNvSpPr>
-          <p:nvPr>
-            <p:ph idx="1"/>
-          </p:nvPr>
-        </p:nvSpPr>
-        <p:spPr/>
-        <p:txBody>
-          <a:bodyPr/>
-          <a:lstStyle/>
-          <a:p>
-            <a:endParaRPr lang="en-US"/>
-          </a:p>
-        </p:txBody>
-      </p:sp>
+          <p:cNvGrpSpPr/>
+          <p:nvPr/>
+        </p:nvGrpSpPr>
+        <p:grpSpPr>
+          <a:xfrm>
+            <a:off x="1080000" y="2160000"/>
+            <a:ext cx="2880000" cy="2880000"/>
+            <a:chOff x="1080000" y="2160000"/>
+            <a:chExt cx="2880000" cy="2880000"/>
+          </a:xfrm>
+        </p:grpSpPr>
+        <p:sp>
+          <p:nvSpPr>
+            <p:cNvPr id="25" name="Rectangle 24">
+              <a:extLst>
+                <a:ext uri="{FF2B5EF4-FFF2-40B4-BE49-F238E27FC236}">
+                  <a16:creationId xmlns:a16="http://schemas.microsoft.com/office/drawing/2014/main" id="{80CE6078-CCBF-8DF7-5299-5EC3D0478A19}"/>
+                </a:ext>
+              </a:extLst>
+            </p:cNvPr>
+            <p:cNvSpPr/>
+            <p:nvPr/>
+          </p:nvSpPr>
+          <p:spPr>
+            <a:xfrm>
+              <a:off x="1080000" y="2160000"/>
+              <a:ext cx="2880000" cy="2880000"/>
+            </a:xfrm>
+            <a:prstGeom prst="rect">
+              <a:avLst/>
+            </a:prstGeom>
+            <a:solidFill>
+              <a:schemeClr val="accent3">
+                <a:lumMod val="75000"/>
+              </a:schemeClr>
+            </a:solidFill>
+            <a:ln>
+              <a:noFill/>
+            </a:ln>
+          </p:spPr>
+          <p:style>
+            <a:lnRef idx="2">
+              <a:schemeClr val="accent1">
+                <a:shade val="15000"/>
+              </a:schemeClr>
+            </a:lnRef>
+            <a:fillRef idx="1">
+              <a:schemeClr val="accent1"/>
+            </a:fillRef>
+            <a:effectRef idx="0">
+              <a:schemeClr val="accent1"/>
+            </a:effectRef>
+            <a:fontRef idx="minor">
+              <a:schemeClr val="lt1"/>
+            </a:fontRef>
+          </p:style>
+          <p:txBody>
+            <a:bodyPr rtlCol="0" anchor="ctr"/>
+            <a:lstStyle/>
+            <a:p>
+              <a:pPr algn="ctr"/>
+              <a:endParaRPr lang="en-NL"/>
+            </a:p>
+          </p:txBody>
+        </p:sp>
+        <p:sp>
+          <p:nvSpPr>
+            <p:cNvPr id="13" name="Oval 12">
+              <a:extLst>
+                <a:ext uri="{FF2B5EF4-FFF2-40B4-BE49-F238E27FC236}">
+                  <a16:creationId xmlns:a16="http://schemas.microsoft.com/office/drawing/2014/main" id="{563007ED-504B-70A6-FDD8-9AC797912A93}"/>
+                </a:ext>
+              </a:extLst>
+            </p:cNvPr>
+            <p:cNvSpPr/>
+            <p:nvPr/>
+          </p:nvSpPr>
+          <p:spPr>
+            <a:xfrm>
+              <a:off x="1080000" y="2160000"/>
+              <a:ext cx="1260000" cy="1260000"/>
+            </a:xfrm>
+            <a:prstGeom prst="ellipse">
+              <a:avLst/>
+            </a:prstGeom>
+            <a:solidFill>
+              <a:schemeClr val="bg1"/>
+            </a:solidFill>
+            <a:ln>
+              <a:noFill/>
+            </a:ln>
+          </p:spPr>
+          <p:style>
+            <a:lnRef idx="2">
+              <a:schemeClr val="accent1">
+                <a:shade val="15000"/>
+              </a:schemeClr>
+            </a:lnRef>
+            <a:fillRef idx="1">
+              <a:schemeClr val="accent1"/>
+            </a:fillRef>
+            <a:effectRef idx="0">
+              <a:schemeClr val="accent1"/>
+            </a:effectRef>
+            <a:fontRef idx="minor">
+              <a:schemeClr val="lt1"/>
+            </a:fontRef>
+          </p:style>
+          <p:txBody>
+            <a:bodyPr rtlCol="0" anchor="ctr"/>
+            <a:lstStyle/>
+            <a:p>
+              <a:pPr algn="ctr"/>
+              <a:endParaRPr lang="en-NL"/>
+            </a:p>
+          </p:txBody>
+        </p:sp>
+        <p:sp>
+          <p:nvSpPr>
+            <p:cNvPr id="14" name="Oval 13">
+              <a:extLst>
+                <a:ext uri="{FF2B5EF4-FFF2-40B4-BE49-F238E27FC236}">
+                  <a16:creationId xmlns:a16="http://schemas.microsoft.com/office/drawing/2014/main" id="{B0501C02-CDE0-03EA-CDE5-038DB18E0612}"/>
+                </a:ext>
+              </a:extLst>
+            </p:cNvPr>
+            <p:cNvSpPr/>
+            <p:nvPr/>
+          </p:nvSpPr>
+          <p:spPr>
+            <a:xfrm>
+              <a:off x="2700000" y="2160000"/>
+              <a:ext cx="1260000" cy="1260000"/>
+            </a:xfrm>
+            <a:prstGeom prst="ellipse">
+              <a:avLst/>
+            </a:prstGeom>
+            <a:solidFill>
+              <a:schemeClr val="bg1"/>
+            </a:solidFill>
+            <a:ln>
+              <a:noFill/>
+            </a:ln>
+          </p:spPr>
+          <p:style>
+            <a:lnRef idx="2">
+              <a:schemeClr val="accent1">
+                <a:shade val="15000"/>
+              </a:schemeClr>
+            </a:lnRef>
+            <a:fillRef idx="1">
+              <a:schemeClr val="accent1"/>
+            </a:fillRef>
+            <a:effectRef idx="0">
+              <a:schemeClr val="accent1"/>
+            </a:effectRef>
+            <a:fontRef idx="minor">
+              <a:schemeClr val="lt1"/>
+            </a:fontRef>
+          </p:style>
+          <p:txBody>
+            <a:bodyPr rtlCol="0" anchor="ctr"/>
+            <a:lstStyle/>
+            <a:p>
+              <a:pPr algn="ctr"/>
+              <a:endParaRPr lang="en-NL"/>
+            </a:p>
+          </p:txBody>
+        </p:sp>
+        <p:sp>
+          <p:nvSpPr>
+            <p:cNvPr id="15" name="Oval 14">
+              <a:extLst>
+                <a:ext uri="{FF2B5EF4-FFF2-40B4-BE49-F238E27FC236}">
+                  <a16:creationId xmlns:a16="http://schemas.microsoft.com/office/drawing/2014/main" id="{C870020E-E682-888F-AD50-C53DE4133AF8}"/>
+                </a:ext>
+              </a:extLst>
+            </p:cNvPr>
+            <p:cNvSpPr/>
+            <p:nvPr/>
+          </p:nvSpPr>
+          <p:spPr>
+            <a:xfrm>
+              <a:off x="2700000" y="3780000"/>
+              <a:ext cx="1260000" cy="1260000"/>
+            </a:xfrm>
+            <a:prstGeom prst="ellipse">
+              <a:avLst/>
+            </a:prstGeom>
+            <a:solidFill>
+              <a:schemeClr val="bg1"/>
+            </a:solidFill>
+            <a:ln>
+              <a:noFill/>
+            </a:ln>
+          </p:spPr>
+          <p:style>
+            <a:lnRef idx="2">
+              <a:schemeClr val="accent1">
+                <a:shade val="15000"/>
+              </a:schemeClr>
+            </a:lnRef>
+            <a:fillRef idx="1">
+              <a:schemeClr val="accent1"/>
+            </a:fillRef>
+            <a:effectRef idx="0">
+              <a:schemeClr val="accent1"/>
+            </a:effectRef>
+            <a:fontRef idx="minor">
+              <a:schemeClr val="lt1"/>
+            </a:fontRef>
+          </p:style>
+          <p:txBody>
+            <a:bodyPr rtlCol="0" anchor="ctr"/>
+            <a:lstStyle/>
+            <a:p>
+              <a:pPr algn="ctr"/>
+              <a:endParaRPr lang="en-NL"/>
+            </a:p>
+          </p:txBody>
+        </p:sp>
+        <p:sp>
+          <p:nvSpPr>
+            <p:cNvPr id="16" name="Oval 15">
+              <a:extLst>
+                <a:ext uri="{FF2B5EF4-FFF2-40B4-BE49-F238E27FC236}">
+                  <a16:creationId xmlns:a16="http://schemas.microsoft.com/office/drawing/2014/main" id="{95139E80-C514-B17B-1787-B5008D3A02ED}"/>
+                </a:ext>
+              </a:extLst>
+            </p:cNvPr>
+            <p:cNvSpPr/>
+            <p:nvPr/>
+          </p:nvSpPr>
+          <p:spPr>
+            <a:xfrm>
+              <a:off x="1080000" y="3780000"/>
+              <a:ext cx="1260000" cy="1260000"/>
+            </a:xfrm>
+            <a:prstGeom prst="ellipse">
+              <a:avLst/>
+            </a:prstGeom>
+            <a:solidFill>
+              <a:schemeClr val="bg1"/>
+            </a:solidFill>
+            <a:ln>
+              <a:noFill/>
+            </a:ln>
+          </p:spPr>
+          <p:style>
+            <a:lnRef idx="2">
+              <a:schemeClr val="accent1">
+                <a:shade val="15000"/>
+              </a:schemeClr>
+            </a:lnRef>
+            <a:fillRef idx="1">
+              <a:schemeClr val="accent1"/>
+            </a:fillRef>
+            <a:effectRef idx="0">
+              <a:schemeClr val="accent1"/>
+            </a:effectRef>
+            <a:fontRef idx="minor">
+              <a:schemeClr val="lt1"/>
+            </a:fontRef>
+          </p:style>
+          <p:txBody>
+            <a:bodyPr rtlCol="0" anchor="ctr"/>
+            <a:lstStyle/>
+            <a:p>
+              <a:pPr algn="ctr"/>
+              <a:endParaRPr lang="en-NL"/>
+            </a:p>
+          </p:txBody>
+        </p:sp>
+        <p:cxnSp>
+          <p:nvCxnSpPr>
+            <p:cNvPr id="17" name="Straight Connector 16">
+              <a:extLst>
+                <a:ext uri="{FF2B5EF4-FFF2-40B4-BE49-F238E27FC236}">
+                  <a16:creationId xmlns:a16="http://schemas.microsoft.com/office/drawing/2014/main" id="{63737174-51E9-AE07-FD64-66B1D28E33D4}"/>
+                </a:ext>
+              </a:extLst>
+            </p:cNvPr>
+            <p:cNvCxnSpPr>
+              <a:cxnSpLocks/>
+            </p:cNvCxnSpPr>
+            <p:nvPr/>
+          </p:nvCxnSpPr>
+          <p:spPr>
+            <a:xfrm flipV="1">
+              <a:off x="1548000" y="2412000"/>
+              <a:ext cx="2160000" cy="2160000"/>
+            </a:xfrm>
+            <a:prstGeom prst="line">
+              <a:avLst/>
+            </a:prstGeom>
+            <a:ln w="266700">
+              <a:solidFill>
+                <a:schemeClr val="bg1"/>
+              </a:solidFill>
+            </a:ln>
+          </p:spPr>
+          <p:style>
+            <a:lnRef idx="1">
+              <a:schemeClr val="accent1"/>
+            </a:lnRef>
+            <a:fillRef idx="0">
+              <a:schemeClr val="accent1"/>
+            </a:fillRef>
+            <a:effectRef idx="0">
+              <a:schemeClr val="accent1"/>
+            </a:effectRef>
+            <a:fontRef idx="minor">
+              <a:schemeClr val="tx1"/>
+            </a:fontRef>
+          </p:style>
+        </p:cxnSp>
+        <p:cxnSp>
+          <p:nvCxnSpPr>
+            <p:cNvPr id="22" name="Straight Connector 21">
+              <a:extLst>
+                <a:ext uri="{FF2B5EF4-FFF2-40B4-BE49-F238E27FC236}">
+                  <a16:creationId xmlns:a16="http://schemas.microsoft.com/office/drawing/2014/main" id="{EDD7ACAD-473D-C6B8-D8E4-92016D041C8C}"/>
+                </a:ext>
+              </a:extLst>
+            </p:cNvPr>
+            <p:cNvCxnSpPr>
+              <a:cxnSpLocks/>
+            </p:cNvCxnSpPr>
+            <p:nvPr/>
+          </p:nvCxnSpPr>
+          <p:spPr>
+            <a:xfrm flipH="1" flipV="1">
+              <a:off x="1368000" y="2484000"/>
+              <a:ext cx="2340000" cy="2340000"/>
+            </a:xfrm>
+            <a:prstGeom prst="line">
+              <a:avLst/>
+            </a:prstGeom>
+            <a:ln w="266700">
+              <a:solidFill>
+                <a:schemeClr val="bg1"/>
+              </a:solidFill>
+            </a:ln>
+          </p:spPr>
+          <p:style>
+            <a:lnRef idx="1">
+              <a:schemeClr val="accent1"/>
+            </a:lnRef>
+            <a:fillRef idx="0">
+              <a:schemeClr val="accent1"/>
+            </a:fillRef>
+            <a:effectRef idx="0">
+              <a:schemeClr val="accent1"/>
+            </a:effectRef>
+            <a:fontRef idx="minor">
+              <a:schemeClr val="tx1"/>
+            </a:fontRef>
+          </p:style>
+        </p:cxnSp>
+        <p:cxnSp>
+          <p:nvCxnSpPr>
+            <p:cNvPr id="42" name="Straight Connector 41">
+              <a:extLst>
+                <a:ext uri="{FF2B5EF4-FFF2-40B4-BE49-F238E27FC236}">
+                  <a16:creationId xmlns:a16="http://schemas.microsoft.com/office/drawing/2014/main" id="{EB4CED8B-54D2-6684-DAB4-25D5B8BDCB21}"/>
+                </a:ext>
+              </a:extLst>
+            </p:cNvPr>
+            <p:cNvCxnSpPr>
+              <a:cxnSpLocks/>
+            </p:cNvCxnSpPr>
+            <p:nvPr/>
+          </p:nvCxnSpPr>
+          <p:spPr>
+            <a:xfrm flipH="1" flipV="1">
+              <a:off x="3420000" y="2730085"/>
+              <a:ext cx="0" cy="1800000"/>
+            </a:xfrm>
+            <a:prstGeom prst="line">
+              <a:avLst/>
+            </a:prstGeom>
+            <a:ln w="266700">
+              <a:solidFill>
+                <a:schemeClr val="bg1"/>
+              </a:solidFill>
+            </a:ln>
+          </p:spPr>
+          <p:style>
+            <a:lnRef idx="1">
+              <a:schemeClr val="accent1"/>
+            </a:lnRef>
+            <a:fillRef idx="0">
+              <a:schemeClr val="accent1"/>
+            </a:fillRef>
+            <a:effectRef idx="0">
+              <a:schemeClr val="accent1"/>
+            </a:effectRef>
+            <a:fontRef idx="minor">
+              <a:schemeClr val="tx1"/>
+            </a:fontRef>
+          </p:style>
+        </p:cxnSp>
+        <p:cxnSp>
+          <p:nvCxnSpPr>
+            <p:cNvPr id="46" name="Straight Connector 45">
+              <a:extLst>
+                <a:ext uri="{FF2B5EF4-FFF2-40B4-BE49-F238E27FC236}">
+                  <a16:creationId xmlns:a16="http://schemas.microsoft.com/office/drawing/2014/main" id="{4735E8B4-907A-89A5-C86D-453C41E79317}"/>
+                </a:ext>
+              </a:extLst>
+            </p:cNvPr>
+            <p:cNvCxnSpPr>
+              <a:cxnSpLocks/>
+            </p:cNvCxnSpPr>
+            <p:nvPr/>
+          </p:nvCxnSpPr>
+          <p:spPr>
+            <a:xfrm flipH="1">
+              <a:off x="1459007" y="4500000"/>
+              <a:ext cx="1800000" cy="0"/>
+            </a:xfrm>
+            <a:prstGeom prst="line">
+              <a:avLst/>
+            </a:prstGeom>
+            <a:ln w="266700">
+              <a:solidFill>
+                <a:schemeClr val="bg1"/>
+              </a:solidFill>
+            </a:ln>
+          </p:spPr>
+          <p:style>
+            <a:lnRef idx="1">
+              <a:schemeClr val="accent1"/>
+            </a:lnRef>
+            <a:fillRef idx="0">
+              <a:schemeClr val="accent1"/>
+            </a:fillRef>
+            <a:effectRef idx="0">
+              <a:schemeClr val="accent1"/>
+            </a:effectRef>
+            <a:fontRef idx="minor">
+              <a:schemeClr val="tx1"/>
+            </a:fontRef>
+          </p:style>
+        </p:cxnSp>
+        <p:cxnSp>
+          <p:nvCxnSpPr>
+            <p:cNvPr id="47" name="Straight Connector 46">
+              <a:extLst>
+                <a:ext uri="{FF2B5EF4-FFF2-40B4-BE49-F238E27FC236}">
+                  <a16:creationId xmlns:a16="http://schemas.microsoft.com/office/drawing/2014/main" id="{D7B328F5-902D-8764-86B0-20BE5CEB2833}"/>
+                </a:ext>
+              </a:extLst>
+            </p:cNvPr>
+            <p:cNvCxnSpPr>
+              <a:cxnSpLocks/>
+            </p:cNvCxnSpPr>
+            <p:nvPr/>
+          </p:nvCxnSpPr>
+          <p:spPr>
+            <a:xfrm flipH="1">
+              <a:off x="1656000" y="2700000"/>
+              <a:ext cx="1800000" cy="0"/>
+            </a:xfrm>
+            <a:prstGeom prst="line">
+              <a:avLst/>
+            </a:prstGeom>
+            <a:ln w="266700">
+              <a:solidFill>
+                <a:schemeClr val="bg1"/>
+              </a:solidFill>
+            </a:ln>
+          </p:spPr>
+          <p:style>
+            <a:lnRef idx="1">
+              <a:schemeClr val="accent1"/>
+            </a:lnRef>
+            <a:fillRef idx="0">
+              <a:schemeClr val="accent1"/>
+            </a:fillRef>
+            <a:effectRef idx="0">
+              <a:schemeClr val="accent1"/>
+            </a:effectRef>
+            <a:fontRef idx="minor">
+              <a:schemeClr val="tx1"/>
+            </a:fontRef>
+          </p:style>
+        </p:cxnSp>
+        <p:cxnSp>
+          <p:nvCxnSpPr>
+            <p:cNvPr id="48" name="Straight Connector 47">
+              <a:extLst>
+                <a:ext uri="{FF2B5EF4-FFF2-40B4-BE49-F238E27FC236}">
+                  <a16:creationId xmlns:a16="http://schemas.microsoft.com/office/drawing/2014/main" id="{21BB1D37-476F-A7C6-C3BB-6595B9B90F2A}"/>
+                </a:ext>
+              </a:extLst>
+            </p:cNvPr>
+            <p:cNvCxnSpPr>
+              <a:cxnSpLocks/>
+            </p:cNvCxnSpPr>
+            <p:nvPr/>
+          </p:nvCxnSpPr>
+          <p:spPr>
+            <a:xfrm flipH="1" flipV="1">
+              <a:off x="1620000" y="2633757"/>
+              <a:ext cx="0" cy="1800000"/>
+            </a:xfrm>
+            <a:prstGeom prst="line">
+              <a:avLst/>
+            </a:prstGeom>
+            <a:ln w="266700">
+              <a:solidFill>
+                <a:schemeClr val="bg1"/>
+              </a:solidFill>
+            </a:ln>
+          </p:spPr>
+          <p:style>
+            <a:lnRef idx="1">
+              <a:schemeClr val="accent1"/>
+            </a:lnRef>
+            <a:fillRef idx="0">
+              <a:schemeClr val="accent1"/>
+            </a:fillRef>
+            <a:effectRef idx="0">
+              <a:schemeClr val="accent1"/>
+            </a:effectRef>
+            <a:fontRef idx="minor">
+              <a:schemeClr val="tx1"/>
+            </a:fontRef>
+          </p:style>
+        </p:cxnSp>
+        <p:pic>
+          <p:nvPicPr>
+            <p:cNvPr id="5" name="Picture 4">
+              <a:extLst>
+                <a:ext uri="{FF2B5EF4-FFF2-40B4-BE49-F238E27FC236}">
+                  <a16:creationId xmlns:a16="http://schemas.microsoft.com/office/drawing/2014/main" id="{FDD9B219-FC36-4894-A3F5-74399A849220}"/>
+                </a:ext>
+              </a:extLst>
+            </p:cNvPr>
+            <p:cNvPicPr>
+              <a:picLocks noChangeAspect="1"/>
+            </p:cNvPicPr>
+            <p:nvPr/>
+          </p:nvPicPr>
+          <p:blipFill>
+            <a:blip r:embed="rId3"/>
+            <a:stretch>
+              <a:fillRect/>
+            </a:stretch>
+          </p:blipFill>
+          <p:spPr>
+            <a:xfrm>
+              <a:off x="1302794" y="2344523"/>
+              <a:ext cx="847123" cy="847123"/>
+            </a:xfrm>
+            <a:prstGeom prst="rect">
+              <a:avLst/>
+            </a:prstGeom>
+          </p:spPr>
+        </p:pic>
+        <p:pic>
+          <p:nvPicPr>
+            <p:cNvPr id="7" name="Picture 6">
+              <a:extLst>
+                <a:ext uri="{FF2B5EF4-FFF2-40B4-BE49-F238E27FC236}">
+                  <a16:creationId xmlns:a16="http://schemas.microsoft.com/office/drawing/2014/main" id="{ED1B1086-4053-DD10-5BAA-D7E7955D55A7}"/>
+                </a:ext>
+              </a:extLst>
+            </p:cNvPr>
+            <p:cNvPicPr>
+              <a:picLocks noChangeAspect="1"/>
+            </p:cNvPicPr>
+            <p:nvPr/>
+          </p:nvPicPr>
+          <p:blipFill>
+            <a:blip r:embed="rId4"/>
+            <a:stretch>
+              <a:fillRect/>
+            </a:stretch>
+          </p:blipFill>
+          <p:spPr>
+            <a:xfrm>
+              <a:off x="2777383" y="3750244"/>
+              <a:ext cx="1105233" cy="1105233"/>
+            </a:xfrm>
+            <a:prstGeom prst="rect">
+              <a:avLst/>
+            </a:prstGeom>
+          </p:spPr>
+        </p:pic>
+        <p:pic>
+          <p:nvPicPr>
+            <p:cNvPr id="9" name="Picture 8">
+              <a:extLst>
+                <a:ext uri="{FF2B5EF4-FFF2-40B4-BE49-F238E27FC236}">
+                  <a16:creationId xmlns:a16="http://schemas.microsoft.com/office/drawing/2014/main" id="{7D31EAA7-A11D-2FE9-03F5-882214FFF045}"/>
+                </a:ext>
+              </a:extLst>
+            </p:cNvPr>
+            <p:cNvPicPr>
+              <a:picLocks noChangeAspect="1"/>
+            </p:cNvPicPr>
+            <p:nvPr/>
+          </p:nvPicPr>
+          <p:blipFill>
+            <a:blip r:embed="rId5"/>
+            <a:stretch>
+              <a:fillRect/>
+            </a:stretch>
+          </p:blipFill>
+          <p:spPr>
+            <a:xfrm>
+              <a:off x="2803535" y="2225862"/>
+              <a:ext cx="1072064" cy="1072064"/>
+            </a:xfrm>
+            <a:prstGeom prst="rect">
+              <a:avLst/>
+            </a:prstGeom>
+          </p:spPr>
+        </p:pic>
+        <p:pic>
+          <p:nvPicPr>
+            <p:cNvPr id="11" name="Picture 10">
+              <a:extLst>
+                <a:ext uri="{FF2B5EF4-FFF2-40B4-BE49-F238E27FC236}">
+                  <a16:creationId xmlns:a16="http://schemas.microsoft.com/office/drawing/2014/main" id="{281D2D7E-340B-9183-3A43-383E8EA8D194}"/>
+                </a:ext>
+              </a:extLst>
+            </p:cNvPr>
+            <p:cNvPicPr>
+              <a:picLocks noChangeAspect="1"/>
+            </p:cNvPicPr>
+            <p:nvPr/>
+          </p:nvPicPr>
+          <p:blipFill>
+            <a:blip r:embed="rId6"/>
+            <a:stretch>
+              <a:fillRect/>
+            </a:stretch>
+          </p:blipFill>
+          <p:spPr>
+            <a:xfrm>
+              <a:off x="1214925" y="3889312"/>
+              <a:ext cx="1018441" cy="1018441"/>
+            </a:xfrm>
+            <a:prstGeom prst="rect">
+              <a:avLst/>
+            </a:prstGeom>
+          </p:spPr>
+        </p:pic>
+      </p:grpSp>
     </p:spTree>
     <p:extLst>
       <p:ext uri="{BB962C8B-B14F-4D97-AF65-F5344CB8AC3E}">
@@ -15305,7 +15941,7 @@
           <a:bodyPr/>
           <a:lstStyle/>
           <a:p>
-            <a:endParaRPr lang="en-US"/>
+            <a:endParaRPr lang="en-US" dirty="0"/>
           </a:p>
         </p:txBody>
       </p:sp>

</xml_diff>